<commit_message>
use stack. update doc
</commit_message>
<xml_diff>
--- a/OS Lab 1.1.pptx
+++ b/OS Lab 1.1.pptx
@@ -10,7 +10,7 @@
     <p:sldId id="261" r:id="rId4"/>
     <p:sldId id="258" r:id="rId5"/>
     <p:sldId id="259" r:id="rId6"/>
-    <p:sldId id="260" r:id="rId7"/>
+    <p:sldId id="262" r:id="rId7"/>
   </p:sldIdLst>
   <p:sldSz cx="12192000" cy="6858000"/>
   <p:notesSz cx="6858000" cy="9144000"/>
@@ -3618,28 +3618,22 @@
       </p:pic>
       <p:pic>
         <p:nvPicPr>
-          <p:cNvPr id="4" name="图片 3"/>
+          <p:cNvPr id="5" name="图片 4"/>
           <p:cNvPicPr>
             <a:picLocks noChangeAspect="1"/>
           </p:cNvPicPr>
           <p:nvPr/>
         </p:nvPicPr>
         <p:blipFill>
-          <a:blip r:embed="rId3">
-            <a:extLst>
-              <a:ext uri="{28A0092B-C50C-407E-A947-70E740481C1C}">
-                <a14:useLocalDpi xmlns:a14="http://schemas.microsoft.com/office/drawing/2010/main" val="0"/>
-              </a:ext>
-            </a:extLst>
-          </a:blip>
+          <a:blip r:embed="rId3"/>
           <a:stretch>
             <a:fillRect/>
           </a:stretch>
         </p:blipFill>
         <p:spPr>
           <a:xfrm>
-            <a:off x="1877563" y="3589685"/>
-            <a:ext cx="8432517" cy="2853644"/>
+            <a:off x="3469684" y="3458527"/>
+            <a:ext cx="5248275" cy="2867025"/>
           </a:xfrm>
           <a:prstGeom prst="rect">
             <a:avLst/>
@@ -3840,8 +3834,8 @@
         </p:nvSpPr>
         <p:spPr>
           <a:xfrm>
-            <a:off x="8920666" y="2599057"/>
-            <a:ext cx="2321947" cy="3108543"/>
+            <a:off x="991512" y="4754429"/>
+            <a:ext cx="3698054" cy="2246769"/>
           </a:xfrm>
           <a:prstGeom prst="rect">
             <a:avLst/>
@@ -3953,7 +3947,7 @@
       </p:sp>
       <p:pic>
         <p:nvPicPr>
-          <p:cNvPr id="4" name="图片 3"/>
+          <p:cNvPr id="6" name="图片 5"/>
           <p:cNvPicPr>
             <a:picLocks noChangeAspect="1"/>
           </p:cNvPicPr>
@@ -3967,8 +3961,8 @@
         </p:blipFill>
         <p:spPr>
           <a:xfrm>
-            <a:off x="3527461" y="1830709"/>
-            <a:ext cx="1895144" cy="4645240"/>
+            <a:off x="815340" y="1350101"/>
+            <a:ext cx="2514600" cy="2381250"/>
           </a:xfrm>
           <a:prstGeom prst="rect">
             <a:avLst/>
@@ -3977,7 +3971,7 @@
       </p:pic>
       <p:pic>
         <p:nvPicPr>
-          <p:cNvPr id="5" name="图片 4"/>
+          <p:cNvPr id="7" name="图片 6"/>
           <p:cNvPicPr>
             <a:picLocks noChangeAspect="1"/>
           </p:cNvPicPr>
@@ -3991,8 +3985,32 @@
         </p:blipFill>
         <p:spPr>
           <a:xfrm>
-            <a:off x="5998312" y="1830709"/>
-            <a:ext cx="1800213" cy="4645240"/>
+            <a:off x="3711347" y="1223334"/>
+            <a:ext cx="3724275" cy="3171825"/>
+          </a:xfrm>
+          <a:prstGeom prst="rect">
+            <a:avLst/>
+          </a:prstGeom>
+        </p:spPr>
+      </p:pic>
+      <p:pic>
+        <p:nvPicPr>
+          <p:cNvPr id="8" name="图片 7"/>
+          <p:cNvPicPr>
+            <a:picLocks noChangeAspect="1"/>
+          </p:cNvPicPr>
+          <p:nvPr/>
+        </p:nvPicPr>
+        <p:blipFill>
+          <a:blip r:embed="rId4"/>
+          <a:stretch>
+            <a:fillRect/>
+          </a:stretch>
+        </p:blipFill>
+        <p:spPr>
+          <a:xfrm>
+            <a:off x="7657420" y="1787434"/>
+            <a:ext cx="4269116" cy="3685903"/>
           </a:xfrm>
           <a:prstGeom prst="rect">
             <a:avLst/>
@@ -4002,7 +4020,7 @@
     </p:spTree>
     <p:extLst>
       <p:ext uri="{BB962C8B-B14F-4D97-AF65-F5344CB8AC3E}">
-        <p14:creationId xmlns:p14="http://schemas.microsoft.com/office/powerpoint/2010/main" val="1121717072"/>
+        <p14:creationId xmlns:p14="http://schemas.microsoft.com/office/powerpoint/2010/main" val="4086952674"/>
       </p:ext>
     </p:extLst>
   </p:cSld>

</xml_diff>